<commit_message>
idk what the changes are
</commit_message>
<xml_diff>
--- a/338presentation.pptx
+++ b/338presentation.pptx
@@ -3222,13 +3222,13 @@
   <p:clrMapOvr>
     <a:masterClrMapping/>
   </p:clrMapOvr>
-  <mc:AlternateContent xmlns:mc="http://schemas.openxmlformats.org/markup-compatibility/2006">
-    <mc:Choice xmlns:p14="http://schemas.microsoft.com/office/powerpoint/2010/main" Requires="p14">
+  <mc:AlternateContent xmlns:mc="http://schemas.openxmlformats.org/markup-compatibility/2006" xmlns:p14="http://schemas.microsoft.com/office/powerpoint/2010/main">
+    <mc:Choice Requires="p14">
       <p:transition spd="med" p14:dur="700">
         <p:fade/>
       </p:transition>
     </mc:Choice>
-    <mc:Fallback>
+    <mc:Fallback xmlns="">
       <p:transition xmlns:p14="http://schemas.microsoft.com/office/powerpoint/2010/main" spd="med">
         <p:fade/>
       </p:transition>
@@ -3319,13 +3319,13 @@
   <p:clrMapOvr>
     <a:masterClrMapping/>
   </p:clrMapOvr>
-  <mc:AlternateContent xmlns:mc="http://schemas.openxmlformats.org/markup-compatibility/2006">
-    <mc:Choice xmlns:p14="http://schemas.microsoft.com/office/powerpoint/2010/main" Requires="p14">
+  <mc:AlternateContent xmlns:mc="http://schemas.openxmlformats.org/markup-compatibility/2006" xmlns:p14="http://schemas.microsoft.com/office/powerpoint/2010/main">
+    <mc:Choice Requires="p14">
       <p:transition spd="med" p14:dur="700">
         <p:fade/>
       </p:transition>
     </mc:Choice>
-    <mc:Fallback>
+    <mc:Fallback xmlns="">
       <p:transition xmlns:p14="http://schemas.microsoft.com/office/powerpoint/2010/main" spd="med">
         <p:fade/>
       </p:transition>
@@ -3457,13 +3457,13 @@
   <p:clrMapOvr>
     <a:masterClrMapping/>
   </p:clrMapOvr>
-  <mc:AlternateContent xmlns:mc="http://schemas.openxmlformats.org/markup-compatibility/2006">
-    <mc:Choice xmlns:p14="http://schemas.microsoft.com/office/powerpoint/2010/main" Requires="p14">
+  <mc:AlternateContent xmlns:mc="http://schemas.openxmlformats.org/markup-compatibility/2006" xmlns:p14="http://schemas.microsoft.com/office/powerpoint/2010/main">
+    <mc:Choice Requires="p14">
       <p:transition spd="med" p14:dur="700">
         <p:fade/>
       </p:transition>
     </mc:Choice>
-    <mc:Fallback>
+    <mc:Fallback xmlns="">
       <p:transition xmlns:p14="http://schemas.microsoft.com/office/powerpoint/2010/main" spd="med">
         <p:fade/>
       </p:transition>
@@ -3582,13 +3582,13 @@
   <p:clrMapOvr>
     <a:masterClrMapping/>
   </p:clrMapOvr>
-  <mc:AlternateContent xmlns:mc="http://schemas.openxmlformats.org/markup-compatibility/2006">
-    <mc:Choice xmlns:p14="http://schemas.microsoft.com/office/powerpoint/2010/main" Requires="p14">
+  <mc:AlternateContent xmlns:mc="http://schemas.openxmlformats.org/markup-compatibility/2006" xmlns:p14="http://schemas.microsoft.com/office/powerpoint/2010/main">
+    <mc:Choice Requires="p14">
       <p:transition spd="med" p14:dur="700">
         <p:fade/>
       </p:transition>
     </mc:Choice>
-    <mc:Fallback>
+    <mc:Fallback xmlns="">
       <p:transition xmlns:p14="http://schemas.microsoft.com/office/powerpoint/2010/main" spd="med">
         <p:fade/>
       </p:transition>
@@ -3654,13 +3654,13 @@
   <p:clrMapOvr>
     <a:masterClrMapping/>
   </p:clrMapOvr>
-  <mc:AlternateContent xmlns:mc="http://schemas.openxmlformats.org/markup-compatibility/2006">
-    <mc:Choice xmlns:p14="http://schemas.microsoft.com/office/powerpoint/2010/main" Requires="p14">
+  <mc:AlternateContent xmlns:mc="http://schemas.openxmlformats.org/markup-compatibility/2006" xmlns:p14="http://schemas.microsoft.com/office/powerpoint/2010/main">
+    <mc:Choice Requires="p14">
       <p:transition spd="med" p14:dur="700">
         <p:fade/>
       </p:transition>
     </mc:Choice>
-    <mc:Fallback>
+    <mc:Fallback xmlns="">
       <p:transition xmlns:p14="http://schemas.microsoft.com/office/powerpoint/2010/main" spd="med">
         <p:fade/>
       </p:transition>
@@ -3764,13 +3764,13 @@
   <p:clrMapOvr>
     <a:masterClrMapping/>
   </p:clrMapOvr>
-  <mc:AlternateContent xmlns:mc="http://schemas.openxmlformats.org/markup-compatibility/2006">
-    <mc:Choice xmlns:p14="http://schemas.microsoft.com/office/powerpoint/2010/main" Requires="p14">
+  <mc:AlternateContent xmlns:mc="http://schemas.openxmlformats.org/markup-compatibility/2006" xmlns:p14="http://schemas.microsoft.com/office/powerpoint/2010/main">
+    <mc:Choice Requires="p14">
       <p:transition spd="med" p14:dur="700">
         <p:fade/>
       </p:transition>
     </mc:Choice>
-    <mc:Fallback>
+    <mc:Fallback xmlns="">
       <p:transition xmlns:p14="http://schemas.microsoft.com/office/powerpoint/2010/main" spd="med">
         <p:fade/>
       </p:transition>
@@ -3927,13 +3927,13 @@
   <p:clrMapOvr>
     <a:masterClrMapping/>
   </p:clrMapOvr>
-  <mc:AlternateContent xmlns:mc="http://schemas.openxmlformats.org/markup-compatibility/2006">
-    <mc:Choice xmlns:p14="http://schemas.microsoft.com/office/powerpoint/2010/main" Requires="p14">
+  <mc:AlternateContent xmlns:mc="http://schemas.openxmlformats.org/markup-compatibility/2006" xmlns:p14="http://schemas.microsoft.com/office/powerpoint/2010/main">
+    <mc:Choice Requires="p14">
       <p:transition spd="med" p14:dur="700">
         <p:fade/>
       </p:transition>
     </mc:Choice>
-    <mc:Fallback>
+    <mc:Fallback xmlns="">
       <p:transition xmlns:p14="http://schemas.microsoft.com/office/powerpoint/2010/main" spd="med">
         <p:fade/>
       </p:transition>
@@ -4321,13 +4321,13 @@
   <p:clrMapOvr>
     <a:masterClrMapping/>
   </p:clrMapOvr>
-  <mc:AlternateContent xmlns:mc="http://schemas.openxmlformats.org/markup-compatibility/2006">
-    <mc:Choice xmlns:p14="http://schemas.microsoft.com/office/powerpoint/2010/main" Requires="p14">
+  <mc:AlternateContent xmlns:mc="http://schemas.openxmlformats.org/markup-compatibility/2006" xmlns:p14="http://schemas.microsoft.com/office/powerpoint/2010/main">
+    <mc:Choice Requires="p14">
       <p:transition spd="med" p14:dur="700">
         <p:fade/>
       </p:transition>
     </mc:Choice>
-    <mc:Fallback>
+    <mc:Fallback xmlns="">
       <p:transition xmlns:p14="http://schemas.microsoft.com/office/powerpoint/2010/main" spd="med">
         <p:fade/>
       </p:transition>
@@ -4763,13 +4763,6 @@
               </a:rPr>
               <a:t>(“Buy Chloroform”);</a:t>
             </a:r>
-            <a:endParaRPr lang="en-US" sz="1100" dirty="0">
-              <a:solidFill>
-                <a:schemeClr val="bg1"/>
-              </a:solidFill>
-              <a:latin typeface="Courier"/>
-              <a:cs typeface="Courier"/>
-            </a:endParaRPr>
           </a:p>
         </p:txBody>
       </p:sp>
@@ -4974,13 +4967,13 @@
   <p:clrMapOvr>
     <a:masterClrMapping/>
   </p:clrMapOvr>
-  <mc:AlternateContent xmlns:mc="http://schemas.openxmlformats.org/markup-compatibility/2006">
-    <mc:Choice xmlns:p14="http://schemas.microsoft.com/office/powerpoint/2010/main" Requires="p14">
+  <mc:AlternateContent xmlns:mc="http://schemas.openxmlformats.org/markup-compatibility/2006" xmlns:p14="http://schemas.microsoft.com/office/powerpoint/2010/main">
+    <mc:Choice Requires="p14">
       <p:transition spd="med" p14:dur="700">
         <p:fade/>
       </p:transition>
     </mc:Choice>
-    <mc:Fallback>
+    <mc:Fallback xmlns="">
       <p:transition xmlns:p14="http://schemas.microsoft.com/office/powerpoint/2010/main" spd="med">
         <p:fade/>
       </p:transition>
@@ -5046,13 +5039,13 @@
   <p:clrMapOvr>
     <a:masterClrMapping/>
   </p:clrMapOvr>
-  <mc:AlternateContent xmlns:mc="http://schemas.openxmlformats.org/markup-compatibility/2006">
-    <mc:Choice xmlns:p14="http://schemas.microsoft.com/office/powerpoint/2010/main" Requires="p14">
+  <mc:AlternateContent xmlns:mc="http://schemas.openxmlformats.org/markup-compatibility/2006" xmlns:p14="http://schemas.microsoft.com/office/powerpoint/2010/main">
+    <mc:Choice Requires="p14">
       <p:transition spd="med" p14:dur="700">
         <p:fade/>
       </p:transition>
     </mc:Choice>
-    <mc:Fallback>
+    <mc:Fallback xmlns="">
       <p:transition xmlns:p14="http://schemas.microsoft.com/office/powerpoint/2010/main" spd="med">
         <p:fade/>
       </p:transition>
@@ -5479,13 +5472,13 @@
   <p:clrMapOvr>
     <a:masterClrMapping/>
   </p:clrMapOvr>
-  <mc:AlternateContent xmlns:mc="http://schemas.openxmlformats.org/markup-compatibility/2006">
-    <mc:Choice xmlns:p14="http://schemas.microsoft.com/office/powerpoint/2010/main" Requires="p14">
+  <mc:AlternateContent xmlns:mc="http://schemas.openxmlformats.org/markup-compatibility/2006" xmlns:p14="http://schemas.microsoft.com/office/powerpoint/2010/main">
+    <mc:Choice Requires="p14">
       <p:transition spd="med" p14:dur="700">
         <p:fade/>
       </p:transition>
     </mc:Choice>
-    <mc:Fallback>
+    <mc:Fallback xmlns="">
       <p:transition xmlns:p14="http://schemas.microsoft.com/office/powerpoint/2010/main" spd="med">
         <p:fade/>
       </p:transition>
@@ -5582,13 +5575,13 @@
   <p:clrMapOvr>
     <a:masterClrMapping/>
   </p:clrMapOvr>
-  <mc:AlternateContent xmlns:mc="http://schemas.openxmlformats.org/markup-compatibility/2006">
-    <mc:Choice xmlns:p14="http://schemas.microsoft.com/office/powerpoint/2010/main" Requires="p14">
+  <mc:AlternateContent xmlns:mc="http://schemas.openxmlformats.org/markup-compatibility/2006" xmlns:p14="http://schemas.microsoft.com/office/powerpoint/2010/main">
+    <mc:Choice Requires="p14">
       <p:transition spd="med" p14:dur="700">
         <p:fade/>
       </p:transition>
     </mc:Choice>
-    <mc:Fallback>
+    <mc:Fallback xmlns="">
       <p:transition xmlns:p14="http://schemas.microsoft.com/office/powerpoint/2010/main" spd="med">
         <p:fade/>
       </p:transition>
@@ -5763,7 +5756,7 @@
                   <a:schemeClr val="bg1"/>
                 </a:solidFill>
               </a:rPr>
-              <a:t>Buy Chloroform</a:t>
+              <a:t>Buy milk</a:t>
             </a:r>
             <a:endParaRPr lang="en-US" dirty="0">
               <a:solidFill>
@@ -5816,7 +5809,15 @@
                   <a:schemeClr val="bg1"/>
                 </a:solidFill>
               </a:rPr>
-              <a:t>Wake up at 4am 11/28/16</a:t>
+              <a:t>Coffee with Dave 11</a:t>
+            </a:r>
+            <a:r>
+              <a:rPr lang="en-US" dirty="0" smtClean="0">
+                <a:solidFill>
+                  <a:schemeClr val="bg1"/>
+                </a:solidFill>
+              </a:rPr>
+              <a:t>/28/16</a:t>
             </a:r>
           </a:p>
         </p:txBody>
@@ -5864,8 +5865,13 @@
                   <a:schemeClr val="bg1"/>
                 </a:solidFill>
               </a:rPr>
-              <a:t>Get Shovel</a:t>
-            </a:r>
+              <a:t>Clean room</a:t>
+            </a:r>
+            <a:endParaRPr lang="en-US" dirty="0" smtClean="0">
+              <a:solidFill>
+                <a:schemeClr val="bg1"/>
+              </a:solidFill>
+            </a:endParaRPr>
           </a:p>
         </p:txBody>
       </p:sp>
@@ -5912,20 +5918,65 @@
                   <a:schemeClr val="bg1"/>
                 </a:solidFill>
               </a:rPr>
-              <a:t>Dig hole</a:t>
-            </a:r>
-          </a:p>
-        </p:txBody>
-      </p:sp>
-      <p:sp>
-        <p:nvSpPr>
-          <p:cNvPr id="9" name="TextBox 8"/>
+              <a:t>Eecs338 project</a:t>
+            </a:r>
+            <a:endParaRPr lang="en-US" dirty="0" smtClean="0">
+              <a:solidFill>
+                <a:schemeClr val="bg1"/>
+              </a:solidFill>
+            </a:endParaRPr>
+          </a:p>
+        </p:txBody>
+      </p:sp>
+      <p:sp>
+        <p:nvSpPr>
+          <p:cNvPr id="11" name="TextBox 10"/>
           <p:cNvSpPr txBox="1"/>
           <p:nvPr/>
         </p:nvSpPr>
         <p:spPr>
           <a:xfrm>
-            <a:off x="1078183" y="5092375"/>
+            <a:off x="5317819" y="1414202"/>
+            <a:ext cx="2403069" cy="369332"/>
+          </a:xfrm>
+          <a:prstGeom prst="rect">
+            <a:avLst/>
+          </a:prstGeom>
+          <a:solidFill>
+            <a:schemeClr val="tx1"/>
+          </a:solidFill>
+        </p:spPr>
+        <p:txBody>
+          <a:bodyPr wrap="square" rtlCol="0">
+            <a:spAutoFit/>
+          </a:bodyPr>
+          <a:lstStyle/>
+          <a:p>
+            <a:r>
+              <a:rPr lang="en-US" dirty="0" smtClean="0">
+                <a:solidFill>
+                  <a:srgbClr val="000000"/>
+                </a:solidFill>
+              </a:rPr>
+              <a:t>216.3.128.12 port 4321</a:t>
+            </a:r>
+            <a:endParaRPr lang="en-US" dirty="0">
+              <a:solidFill>
+                <a:srgbClr val="000000"/>
+              </a:solidFill>
+            </a:endParaRPr>
+          </a:p>
+        </p:txBody>
+      </p:sp>
+      <p:sp>
+        <p:nvSpPr>
+          <p:cNvPr id="12" name="TextBox 11"/>
+          <p:cNvSpPr txBox="1"/>
+          <p:nvPr/>
+        </p:nvSpPr>
+        <p:spPr>
+          <a:xfrm>
+            <a:off x="4985951" y="1882096"/>
             <a:ext cx="3051808" cy="646331"/>
           </a:xfrm>
           <a:prstGeom prst="rect">
@@ -5960,95 +6011,7 @@
                   <a:schemeClr val="bg1"/>
                 </a:solidFill>
               </a:rPr>
-              <a:t>Fill hole</a:t>
-            </a:r>
-          </a:p>
-        </p:txBody>
-      </p:sp>
-      <p:sp>
-        <p:nvSpPr>
-          <p:cNvPr id="11" name="TextBox 10"/>
-          <p:cNvSpPr txBox="1"/>
-          <p:nvPr/>
-        </p:nvSpPr>
-        <p:spPr>
-          <a:xfrm>
-            <a:off x="5317819" y="1414202"/>
-            <a:ext cx="2403069" cy="369332"/>
-          </a:xfrm>
-          <a:prstGeom prst="rect">
-            <a:avLst/>
-          </a:prstGeom>
-          <a:solidFill>
-            <a:schemeClr val="tx1"/>
-          </a:solidFill>
-        </p:spPr>
-        <p:txBody>
-          <a:bodyPr wrap="square" rtlCol="0">
-            <a:spAutoFit/>
-          </a:bodyPr>
-          <a:lstStyle/>
-          <a:p>
-            <a:r>
-              <a:rPr lang="en-US" dirty="0" smtClean="0">
-                <a:solidFill>
-                  <a:srgbClr val="000000"/>
-                </a:solidFill>
-              </a:rPr>
-              <a:t>216.3.128.12 port 4321</a:t>
-            </a:r>
-            <a:endParaRPr lang="en-US" dirty="0">
-              <a:solidFill>
-                <a:srgbClr val="000000"/>
-              </a:solidFill>
-            </a:endParaRPr>
-          </a:p>
-        </p:txBody>
-      </p:sp>
-      <p:sp>
-        <p:nvSpPr>
-          <p:cNvPr id="12" name="TextBox 11"/>
-          <p:cNvSpPr txBox="1"/>
-          <p:nvPr/>
-        </p:nvSpPr>
-        <p:spPr>
-          <a:xfrm>
-            <a:off x="4985951" y="1882096"/>
-            <a:ext cx="3051808" cy="646331"/>
-          </a:xfrm>
-          <a:prstGeom prst="rect">
-            <a:avLst/>
-          </a:prstGeom>
-          <a:solidFill>
-            <a:schemeClr val="accent3">
-              <a:lumMod val="60000"/>
-              <a:lumOff val="40000"/>
-            </a:schemeClr>
-          </a:solidFill>
-        </p:spPr>
-        <p:txBody>
-          <a:bodyPr wrap="square" rtlCol="0">
-            <a:spAutoFit/>
-          </a:bodyPr>
-          <a:lstStyle/>
-          <a:p>
-            <a:r>
-              <a:rPr lang="en-US" dirty="0" smtClean="0">
-                <a:solidFill>
-                  <a:schemeClr val="bg1"/>
-                </a:solidFill>
-              </a:rPr>
-              <a:t>&lt;Task&gt;</a:t>
-            </a:r>
-          </a:p>
-          <a:p>
-            <a:r>
-              <a:rPr lang="en-US" dirty="0" smtClean="0">
-                <a:solidFill>
-                  <a:schemeClr val="bg1"/>
-                </a:solidFill>
-              </a:rPr>
-              <a:t>Buy Chloroform</a:t>
+              <a:t>Buy Milk</a:t>
             </a:r>
             <a:endParaRPr lang="en-US" dirty="0">
               <a:solidFill>
@@ -6068,13 +6031,13 @@
   <p:clrMapOvr>
     <a:masterClrMapping/>
   </p:clrMapOvr>
-  <mc:AlternateContent xmlns:mc="http://schemas.openxmlformats.org/markup-compatibility/2006">
-    <mc:Choice xmlns:p14="http://schemas.microsoft.com/office/powerpoint/2010/main" Requires="p14">
+  <mc:AlternateContent xmlns:mc="http://schemas.openxmlformats.org/markup-compatibility/2006" xmlns:p14="http://schemas.microsoft.com/office/powerpoint/2010/main">
+    <mc:Choice Requires="p14">
       <p:transition spd="med" p14:dur="700">
         <p:fade/>
       </p:transition>
     </mc:Choice>
-    <mc:Fallback>
+    <mc:Fallback xmlns="">
       <p:transition xmlns:p14="http://schemas.microsoft.com/office/powerpoint/2010/main" spd="med">
         <p:fade/>
       </p:transition>
@@ -6602,13 +6565,13 @@
   <p:clrMapOvr>
     <a:masterClrMapping/>
   </p:clrMapOvr>
-  <mc:AlternateContent xmlns:mc="http://schemas.openxmlformats.org/markup-compatibility/2006">
-    <mc:Choice xmlns:p14="http://schemas.microsoft.com/office/powerpoint/2010/main" Requires="p14">
+  <mc:AlternateContent xmlns:mc="http://schemas.openxmlformats.org/markup-compatibility/2006" xmlns:p14="http://schemas.microsoft.com/office/powerpoint/2010/main">
+    <mc:Choice Requires="p14">
       <p:transition spd="med" p14:dur="700">
         <p:fade/>
       </p:transition>
     </mc:Choice>
-    <mc:Fallback>
+    <mc:Fallback xmlns="">
       <p:transition xmlns:p14="http://schemas.microsoft.com/office/powerpoint/2010/main" spd="med">
         <p:fade/>
       </p:transition>
@@ -7184,13 +7147,13 @@
   <p:clrMapOvr>
     <a:masterClrMapping/>
   </p:clrMapOvr>
-  <mc:AlternateContent xmlns:mc="http://schemas.openxmlformats.org/markup-compatibility/2006">
-    <mc:Choice xmlns:p14="http://schemas.microsoft.com/office/powerpoint/2010/main" Requires="p14">
+  <mc:AlternateContent xmlns:mc="http://schemas.openxmlformats.org/markup-compatibility/2006" xmlns:p14="http://schemas.microsoft.com/office/powerpoint/2010/main">
+    <mc:Choice Requires="p14">
       <p:transition spd="med" p14:dur="700">
         <p:fade/>
       </p:transition>
     </mc:Choice>
-    <mc:Fallback>
+    <mc:Fallback xmlns="">
       <p:transition xmlns:p14="http://schemas.microsoft.com/office/powerpoint/2010/main" spd="med">
         <p:fade/>
       </p:transition>
@@ -7814,13 +7777,13 @@
   <p:clrMapOvr>
     <a:masterClrMapping/>
   </p:clrMapOvr>
-  <mc:AlternateContent xmlns:mc="http://schemas.openxmlformats.org/markup-compatibility/2006">
-    <mc:Choice xmlns:p14="http://schemas.microsoft.com/office/powerpoint/2010/main" Requires="p14">
+  <mc:AlternateContent xmlns:mc="http://schemas.openxmlformats.org/markup-compatibility/2006" xmlns:p14="http://schemas.microsoft.com/office/powerpoint/2010/main">
+    <mc:Choice Requires="p14">
       <p:transition spd="med" p14:dur="700">
         <p:fade/>
       </p:transition>
     </mc:Choice>
-    <mc:Fallback>
+    <mc:Fallback xmlns="">
       <p:transition xmlns:p14="http://schemas.microsoft.com/office/powerpoint/2010/main" spd="med">
         <p:fade/>
       </p:transition>
@@ -8492,13 +8455,13 @@
   <p:clrMapOvr>
     <a:masterClrMapping/>
   </p:clrMapOvr>
-  <mc:AlternateContent xmlns:mc="http://schemas.openxmlformats.org/markup-compatibility/2006">
-    <mc:Choice xmlns:p14="http://schemas.microsoft.com/office/powerpoint/2010/main" Requires="p14">
+  <mc:AlternateContent xmlns:mc="http://schemas.openxmlformats.org/markup-compatibility/2006" xmlns:p14="http://schemas.microsoft.com/office/powerpoint/2010/main">
+    <mc:Choice Requires="p14">
       <p:transition spd="med" p14:dur="700">
         <p:fade/>
       </p:transition>
     </mc:Choice>
-    <mc:Fallback>
+    <mc:Fallback xmlns="">
       <p:transition xmlns:p14="http://schemas.microsoft.com/office/powerpoint/2010/main" spd="med">
         <p:fade/>
       </p:transition>
@@ -9170,13 +9133,13 @@
   <p:clrMapOvr>
     <a:masterClrMapping/>
   </p:clrMapOvr>
-  <mc:AlternateContent xmlns:mc="http://schemas.openxmlformats.org/markup-compatibility/2006">
-    <mc:Choice xmlns:p14="http://schemas.microsoft.com/office/powerpoint/2010/main" Requires="p14">
+  <mc:AlternateContent xmlns:mc="http://schemas.openxmlformats.org/markup-compatibility/2006" xmlns:p14="http://schemas.microsoft.com/office/powerpoint/2010/main">
+    <mc:Choice Requires="p14">
       <p:transition spd="med" p14:dur="700">
         <p:fade/>
       </p:transition>
     </mc:Choice>
-    <mc:Fallback>
+    <mc:Fallback xmlns="">
       <p:transition xmlns:p14="http://schemas.microsoft.com/office/powerpoint/2010/main" spd="med">
         <p:fade/>
       </p:transition>
@@ -9848,13 +9811,13 @@
   <p:clrMapOvr>
     <a:masterClrMapping/>
   </p:clrMapOvr>
-  <mc:AlternateContent xmlns:mc="http://schemas.openxmlformats.org/markup-compatibility/2006">
-    <mc:Choice xmlns:p14="http://schemas.microsoft.com/office/powerpoint/2010/main" Requires="p14">
+  <mc:AlternateContent xmlns:mc="http://schemas.openxmlformats.org/markup-compatibility/2006" xmlns:p14="http://schemas.microsoft.com/office/powerpoint/2010/main">
+    <mc:Choice Requires="p14">
       <p:transition spd="med" p14:dur="700">
         <p:fade/>
       </p:transition>
     </mc:Choice>
-    <mc:Fallback>
+    <mc:Fallback xmlns="">
       <p:transition xmlns:p14="http://schemas.microsoft.com/office/powerpoint/2010/main" spd="med">
         <p:fade/>
       </p:transition>
@@ -10473,13 +10436,13 @@
   <p:clrMapOvr>
     <a:masterClrMapping/>
   </p:clrMapOvr>
-  <mc:AlternateContent xmlns:mc="http://schemas.openxmlformats.org/markup-compatibility/2006">
-    <mc:Choice xmlns:p14="http://schemas.microsoft.com/office/powerpoint/2010/main" Requires="p14">
+  <mc:AlternateContent xmlns:mc="http://schemas.openxmlformats.org/markup-compatibility/2006" xmlns:p14="http://schemas.microsoft.com/office/powerpoint/2010/main">
+    <mc:Choice Requires="p14">
       <p:transition spd="med" p14:dur="700">
         <p:fade/>
       </p:transition>
     </mc:Choice>
-    <mc:Fallback>
+    <mc:Fallback xmlns="">
       <p:transition xmlns:p14="http://schemas.microsoft.com/office/powerpoint/2010/main" spd="med">
         <p:fade/>
       </p:transition>
@@ -11045,13 +11008,13 @@
   <p:clrMapOvr>
     <a:masterClrMapping/>
   </p:clrMapOvr>
-  <mc:AlternateContent xmlns:mc="http://schemas.openxmlformats.org/markup-compatibility/2006">
-    <mc:Choice xmlns:p14="http://schemas.microsoft.com/office/powerpoint/2010/main" Requires="p14">
+  <mc:AlternateContent xmlns:mc="http://schemas.openxmlformats.org/markup-compatibility/2006" xmlns:p14="http://schemas.microsoft.com/office/powerpoint/2010/main">
+    <mc:Choice Requires="p14">
       <p:transition spd="med" p14:dur="700">
         <p:fade/>
       </p:transition>
     </mc:Choice>
-    <mc:Fallback>
+    <mc:Fallback xmlns="">
       <p:transition xmlns:p14="http://schemas.microsoft.com/office/powerpoint/2010/main" spd="med">
         <p:fade/>
       </p:transition>
@@ -11480,13 +11443,13 @@
   <p:clrMapOvr>
     <a:masterClrMapping/>
   </p:clrMapOvr>
-  <mc:AlternateContent xmlns:mc="http://schemas.openxmlformats.org/markup-compatibility/2006">
-    <mc:Choice xmlns:p14="http://schemas.microsoft.com/office/powerpoint/2010/main" Requires="p14">
+  <mc:AlternateContent xmlns:mc="http://schemas.openxmlformats.org/markup-compatibility/2006" xmlns:p14="http://schemas.microsoft.com/office/powerpoint/2010/main">
+    <mc:Choice Requires="p14">
       <p:transition spd="med" p14:dur="700">
         <p:fade/>
       </p:transition>
     </mc:Choice>
-    <mc:Fallback>
+    <mc:Fallback xmlns="">
       <p:transition xmlns:p14="http://schemas.microsoft.com/office/powerpoint/2010/main" spd="med">
         <p:fade/>
       </p:transition>
@@ -11997,13 +11960,13 @@
   <p:clrMapOvr>
     <a:masterClrMapping/>
   </p:clrMapOvr>
-  <mc:AlternateContent xmlns:mc="http://schemas.openxmlformats.org/markup-compatibility/2006">
-    <mc:Choice xmlns:p14="http://schemas.microsoft.com/office/powerpoint/2010/main" Requires="p14">
+  <mc:AlternateContent xmlns:mc="http://schemas.openxmlformats.org/markup-compatibility/2006" xmlns:p14="http://schemas.microsoft.com/office/powerpoint/2010/main">
+    <mc:Choice Requires="p14">
       <p:transition spd="med" p14:dur="700">
         <p:fade/>
       </p:transition>
     </mc:Choice>
-    <mc:Fallback>
+    <mc:Fallback xmlns="">
       <p:transition xmlns:p14="http://schemas.microsoft.com/office/powerpoint/2010/main" spd="med">
         <p:fade/>
       </p:transition>
@@ -12091,13 +12054,13 @@
   <p:clrMapOvr>
     <a:masterClrMapping/>
   </p:clrMapOvr>
-  <mc:AlternateContent xmlns:mc="http://schemas.openxmlformats.org/markup-compatibility/2006">
-    <mc:Choice xmlns:p14="http://schemas.microsoft.com/office/powerpoint/2010/main" Requires="p14">
+  <mc:AlternateContent xmlns:mc="http://schemas.openxmlformats.org/markup-compatibility/2006" xmlns:p14="http://schemas.microsoft.com/office/powerpoint/2010/main">
+    <mc:Choice Requires="p14">
       <p:transition spd="med" p14:dur="700">
         <p:fade/>
       </p:transition>
     </mc:Choice>
-    <mc:Fallback>
+    <mc:Fallback xmlns="">
       <p:transition xmlns:p14="http://schemas.microsoft.com/office/powerpoint/2010/main" spd="med">
         <p:fade/>
       </p:transition>
@@ -12188,13 +12151,13 @@
   <p:clrMapOvr>
     <a:masterClrMapping/>
   </p:clrMapOvr>
-  <mc:AlternateContent xmlns:mc="http://schemas.openxmlformats.org/markup-compatibility/2006">
-    <mc:Choice xmlns:p14="http://schemas.microsoft.com/office/powerpoint/2010/main" Requires="p14">
+  <mc:AlternateContent xmlns:mc="http://schemas.openxmlformats.org/markup-compatibility/2006" xmlns:p14="http://schemas.microsoft.com/office/powerpoint/2010/main">
+    <mc:Choice Requires="p14">
       <p:transition spd="med" p14:dur="700">
         <p:fade/>
       </p:transition>
     </mc:Choice>
-    <mc:Fallback>
+    <mc:Fallback xmlns="">
       <p:transition xmlns:p14="http://schemas.microsoft.com/office/powerpoint/2010/main" spd="med">
         <p:fade/>
       </p:transition>
@@ -12285,13 +12248,13 @@
   <p:clrMapOvr>
     <a:masterClrMapping/>
   </p:clrMapOvr>
-  <mc:AlternateContent xmlns:mc="http://schemas.openxmlformats.org/markup-compatibility/2006">
-    <mc:Choice xmlns:p14="http://schemas.microsoft.com/office/powerpoint/2010/main" Requires="p14">
+  <mc:AlternateContent xmlns:mc="http://schemas.openxmlformats.org/markup-compatibility/2006" xmlns:p14="http://schemas.microsoft.com/office/powerpoint/2010/main">
+    <mc:Choice Requires="p14">
       <p:transition spd="med" p14:dur="700">
         <p:fade/>
       </p:transition>
     </mc:Choice>
-    <mc:Fallback>
+    <mc:Fallback xmlns="">
       <p:transition xmlns:p14="http://schemas.microsoft.com/office/powerpoint/2010/main" spd="med">
         <p:fade/>
       </p:transition>
@@ -12382,13 +12345,13 @@
   <p:clrMapOvr>
     <a:masterClrMapping/>
   </p:clrMapOvr>
-  <mc:AlternateContent xmlns:mc="http://schemas.openxmlformats.org/markup-compatibility/2006">
-    <mc:Choice xmlns:p14="http://schemas.microsoft.com/office/powerpoint/2010/main" Requires="p14">
+  <mc:AlternateContent xmlns:mc="http://schemas.openxmlformats.org/markup-compatibility/2006" xmlns:p14="http://schemas.microsoft.com/office/powerpoint/2010/main">
+    <mc:Choice Requires="p14">
       <p:transition spd="med" p14:dur="700">
         <p:fade/>
       </p:transition>
     </mc:Choice>
-    <mc:Fallback>
+    <mc:Fallback xmlns="">
       <p:transition xmlns:p14="http://schemas.microsoft.com/office/powerpoint/2010/main" spd="med">
         <p:fade/>
       </p:transition>
@@ -12479,13 +12442,13 @@
   <p:clrMapOvr>
     <a:masterClrMapping/>
   </p:clrMapOvr>
-  <mc:AlternateContent xmlns:mc="http://schemas.openxmlformats.org/markup-compatibility/2006">
-    <mc:Choice xmlns:p14="http://schemas.microsoft.com/office/powerpoint/2010/main" Requires="p14">
+  <mc:AlternateContent xmlns:mc="http://schemas.openxmlformats.org/markup-compatibility/2006" xmlns:p14="http://schemas.microsoft.com/office/powerpoint/2010/main">
+    <mc:Choice Requires="p14">
       <p:transition spd="med" p14:dur="700">
         <p:fade/>
       </p:transition>
     </mc:Choice>
-    <mc:Fallback>
+    <mc:Fallback xmlns="">
       <p:transition xmlns:p14="http://schemas.microsoft.com/office/powerpoint/2010/main" spd="med">
         <p:fade/>
       </p:transition>

</xml_diff>